<commit_message>
5th Screen is in progress
5th Screen is in progress
</commit_message>
<xml_diff>
--- a/ITProjectManagement/BA/SpecsWireframes/MVP/wireframe.pptx
+++ b/ITProjectManagement/BA/SpecsWireframes/MVP/wireframe.pptx
@@ -129,7 +129,7 @@
       </p14:sectionLst>
     </p:ext>
     <p:ext uri="{EFAFB233-063F-42B5-8137-9DF3F51BA10A}">
-      <p15:sldGuideLst xmlns="" xmlns:p15="http://schemas.microsoft.com/office/powerpoint/2012/main"/>
+      <p15:sldGuideLst xmlns:p15="http://schemas.microsoft.com/office/powerpoint/2012/main" xmlns=""/>
     </p:ext>
   </p:extLst>
 </p:presentation>
@@ -8208,13 +8208,8 @@
           <a:p>
             <a:r>
               <a:rPr lang="en-AU" sz="1200" dirty="0" smtClean="0"/>
-              <a:t>Color: #</a:t>
-            </a:r>
-            <a:r>
-              <a:rPr lang="en-AU" sz="1200" dirty="0" smtClean="0"/>
-              <a:t>2f5597</a:t>
-            </a:r>
-            <a:endParaRPr lang="en-AU" sz="1200" dirty="0" smtClean="0"/>
+              <a:t>Color: #2f5597</a:t>
+            </a:r>
           </a:p>
         </p:txBody>
       </p:sp>
@@ -8384,13 +8379,8 @@
           <a:p>
             <a:r>
               <a:rPr lang="en-AU" sz="1200" dirty="0" smtClean="0"/>
-              <a:t>Color: </a:t>
-            </a:r>
-            <a:r>
-              <a:rPr lang="en-AU" sz="1200" dirty="0" smtClean="0"/>
-              <a:t>Red</a:t>
-            </a:r>
-            <a:endParaRPr lang="en-AU" sz="1200" dirty="0" smtClean="0"/>
+              <a:t>Color: Red</a:t>
+            </a:r>
           </a:p>
         </p:txBody>
       </p:sp>
@@ -8546,13 +8536,8 @@
             </a:r>
             <a:r>
               <a:rPr lang="en-AU" sz="1200" dirty="0" smtClean="0"/>
-              <a:t>: </a:t>
-            </a:r>
-            <a:r>
-              <a:rPr lang="en-AU" sz="1200" dirty="0" smtClean="0"/>
-              <a:t>16</a:t>
-            </a:r>
-            <a:endParaRPr lang="en-AU" sz="1200" dirty="0" smtClean="0"/>
+              <a:t>: 16</a:t>
+            </a:r>
           </a:p>
           <a:p>
             <a:r>
@@ -8563,13 +8548,8 @@
           <a:p>
             <a:r>
               <a:rPr lang="en-AU" sz="1200" dirty="0" smtClean="0"/>
-              <a:t>Color: </a:t>
-            </a:r>
-            <a:r>
-              <a:rPr lang="en-AU" sz="1200" dirty="0" smtClean="0"/>
-              <a:t>Blue</a:t>
-            </a:r>
-            <a:endParaRPr lang="en-AU" sz="1200" dirty="0" smtClean="0"/>
+              <a:t>Color: Blue</a:t>
+            </a:r>
           </a:p>
         </p:txBody>
       </p:sp>
@@ -8637,13 +8617,8 @@
             </a:r>
             <a:r>
               <a:rPr lang="en-AU" sz="1200" dirty="0" smtClean="0"/>
-              <a:t>: </a:t>
-            </a:r>
-            <a:r>
-              <a:rPr lang="en-AU" sz="1200" dirty="0" smtClean="0"/>
-              <a:t>16</a:t>
-            </a:r>
-            <a:endParaRPr lang="en-AU" sz="1200" dirty="0" smtClean="0"/>
+              <a:t>: 16</a:t>
+            </a:r>
           </a:p>
           <a:p>
             <a:r>
@@ -8654,17 +8629,8 @@
           <a:p>
             <a:r>
               <a:rPr lang="en-AU" sz="1200" dirty="0" smtClean="0"/>
-              <a:t>Color: </a:t>
-            </a:r>
-            <a:r>
-              <a:rPr lang="en-AU" sz="1200" dirty="0" smtClean="0"/>
-              <a:t>Light </a:t>
-            </a:r>
-            <a:r>
-              <a:rPr lang="en-AU" sz="1200" dirty="0" smtClean="0"/>
-              <a:t>Blue</a:t>
-            </a:r>
-            <a:endParaRPr lang="en-AU" sz="1200" dirty="0" smtClean="0"/>
+              <a:t>Color: Light Blue</a:t>
+            </a:r>
           </a:p>
         </p:txBody>
       </p:sp>
@@ -10632,8 +10598,8 @@
         </p:nvSpPr>
         <p:spPr>
           <a:xfrm>
-            <a:off x="1748880" y="2506362"/>
-            <a:ext cx="3557216" cy="1737516"/>
+            <a:off x="1910572" y="3220506"/>
+            <a:ext cx="3233833" cy="1045912"/>
           </a:xfrm>
           <a:prstGeom prst="rect">
             <a:avLst/>
@@ -10782,8 +10748,8 @@
         </p:nvSpPr>
         <p:spPr>
           <a:xfrm>
-            <a:off x="2015543" y="930499"/>
-            <a:ext cx="2820473" cy="386366"/>
+            <a:off x="2015543" y="749353"/>
+            <a:ext cx="2820473" cy="309846"/>
           </a:xfrm>
           <a:prstGeom prst="roundRect">
             <a:avLst/>
@@ -10842,8 +10808,8 @@
         </p:nvSpPr>
         <p:spPr>
           <a:xfrm>
-            <a:off x="4381615" y="930499"/>
-            <a:ext cx="454401" cy="386366"/>
+            <a:off x="4372989" y="749353"/>
+            <a:ext cx="454401" cy="301220"/>
           </a:xfrm>
           <a:prstGeom prst="roundRect">
             <a:avLst/>
@@ -10887,7 +10853,7 @@
         </p:nvSpPr>
         <p:spPr>
           <a:xfrm>
-            <a:off x="4463381" y="967367"/>
+            <a:off x="4463381" y="794847"/>
             <a:ext cx="206545" cy="233751"/>
           </a:xfrm>
           <a:prstGeom prst="ellipse">
@@ -10933,8 +10899,8 @@
         </p:nvCxnSpPr>
         <p:spPr>
           <a:xfrm>
-            <a:off x="4655125" y="1160862"/>
-            <a:ext cx="123627" cy="141715"/>
+            <a:off x="4665853" y="867578"/>
+            <a:ext cx="102171" cy="141715"/>
           </a:xfrm>
           <a:prstGeom prst="line">
             <a:avLst/>
@@ -11610,8 +11576,8 @@
         </p:nvSpPr>
         <p:spPr>
           <a:xfrm>
-            <a:off x="2046776" y="1399586"/>
-            <a:ext cx="2764294" cy="1020439"/>
+            <a:off x="2029523" y="1175311"/>
+            <a:ext cx="2809309" cy="1429866"/>
           </a:xfrm>
           <a:prstGeom prst="rect">
             <a:avLst/>
@@ -11646,35 +11612,6 @@
           <a:lstStyle/>
           <a:p>
             <a:endParaRPr lang="en-AU" dirty="0"/>
-          </a:p>
-        </p:txBody>
-      </p:sp>
-      <p:sp>
-        <p:nvSpPr>
-          <p:cNvPr id="26" name="TextBox 25"/>
-          <p:cNvSpPr txBox="1"/>
-          <p:nvPr/>
-        </p:nvSpPr>
-        <p:spPr>
-          <a:xfrm>
-            <a:off x="2039687" y="1401007"/>
-            <a:ext cx="1964465" cy="338554"/>
-          </a:xfrm>
-          <a:prstGeom prst="rect">
-            <a:avLst/>
-          </a:prstGeom>
-          <a:noFill/>
-        </p:spPr>
-        <p:txBody>
-          <a:bodyPr wrap="square" rtlCol="0">
-            <a:spAutoFit/>
-          </a:bodyPr>
-          <a:lstStyle/>
-          <a:p>
-            <a:r>
-              <a:rPr lang="en-AU" sz="1600" dirty="0" smtClean="0"/>
-              <a:t>Search Filters here …</a:t>
-            </a:r>
           </a:p>
         </p:txBody>
       </p:sp>
@@ -11865,8 +11802,8 @@
         </p:nvCxnSpPr>
         <p:spPr>
           <a:xfrm flipV="1">
-            <a:off x="4778754" y="1562217"/>
-            <a:ext cx="2241023" cy="512253"/>
+            <a:off x="5000584" y="1562217"/>
+            <a:ext cx="2019193" cy="512253"/>
           </a:xfrm>
           <a:prstGeom prst="line">
             <a:avLst/>
@@ -12547,7 +12484,7 @@
         </p:nvSpPr>
         <p:spPr>
           <a:xfrm>
-            <a:off x="1728062" y="2536045"/>
+            <a:off x="1920381" y="2786211"/>
             <a:ext cx="1964465" cy="338554"/>
           </a:xfrm>
           <a:prstGeom prst="rect">
@@ -12917,6 +12854,321 @@
               <a:t>logged in user comes here</a:t>
             </a:r>
             <a:endParaRPr lang="en-AU" b="1" u="sng" dirty="0" smtClean="0"/>
+          </a:p>
+        </p:txBody>
+      </p:sp>
+      <p:sp>
+        <p:nvSpPr>
+          <p:cNvPr id="2" name="Rectangle 1"/>
+          <p:cNvSpPr/>
+          <p:nvPr/>
+        </p:nvSpPr>
+        <p:spPr>
+          <a:xfrm>
+            <a:off x="2104845" y="1250830"/>
+            <a:ext cx="2663179" cy="224287"/>
+          </a:xfrm>
+          <a:prstGeom prst="rect">
+            <a:avLst/>
+          </a:prstGeom>
+        </p:spPr>
+        <p:style>
+          <a:lnRef idx="2">
+            <a:schemeClr val="accent6"/>
+          </a:lnRef>
+          <a:fillRef idx="1">
+            <a:schemeClr val="lt1"/>
+          </a:fillRef>
+          <a:effectRef idx="0">
+            <a:schemeClr val="accent6"/>
+          </a:effectRef>
+          <a:fontRef idx="minor">
+            <a:schemeClr val="dk1"/>
+          </a:fontRef>
+        </p:style>
+        <p:txBody>
+          <a:bodyPr rtlCol="0" anchor="ctr"/>
+          <a:lstStyle/>
+          <a:p>
+            <a:r>
+              <a:rPr lang="en-US" sz="1200" dirty="0" smtClean="0">
+                <a:latin typeface="Arial" pitchFamily="34" charset="0"/>
+                <a:cs typeface="Arial" pitchFamily="34" charset="0"/>
+              </a:rPr>
+              <a:t>Subject</a:t>
+            </a:r>
+            <a:endParaRPr lang="en-IN" sz="1200" dirty="0">
+              <a:latin typeface="Arial" pitchFamily="34" charset="0"/>
+              <a:cs typeface="Arial" pitchFamily="34" charset="0"/>
+            </a:endParaRPr>
+          </a:p>
+        </p:txBody>
+      </p:sp>
+      <p:sp>
+        <p:nvSpPr>
+          <p:cNvPr id="4" name="Down Arrow 3"/>
+          <p:cNvSpPr/>
+          <p:nvPr/>
+        </p:nvSpPr>
+        <p:spPr>
+          <a:xfrm>
+            <a:off x="4623115" y="1270293"/>
+            <a:ext cx="116245" cy="185361"/>
+          </a:xfrm>
+          <a:prstGeom prst="downArrow">
+            <a:avLst/>
+          </a:prstGeom>
+        </p:spPr>
+        <p:style>
+          <a:lnRef idx="2">
+            <a:schemeClr val="accent1">
+              <a:shade val="50000"/>
+            </a:schemeClr>
+          </a:lnRef>
+          <a:fillRef idx="1">
+            <a:schemeClr val="accent1"/>
+          </a:fillRef>
+          <a:effectRef idx="0">
+            <a:schemeClr val="accent1"/>
+          </a:effectRef>
+          <a:fontRef idx="minor">
+            <a:schemeClr val="lt1"/>
+          </a:fontRef>
+        </p:style>
+        <p:txBody>
+          <a:bodyPr rtlCol="0" anchor="ctr"/>
+          <a:lstStyle/>
+          <a:p>
+            <a:pPr algn="ctr"/>
+            <a:endParaRPr lang="en-IN"/>
+          </a:p>
+        </p:txBody>
+      </p:sp>
+      <p:sp>
+        <p:nvSpPr>
+          <p:cNvPr id="67" name="Rectangle 66"/>
+          <p:cNvSpPr/>
+          <p:nvPr/>
+        </p:nvSpPr>
+        <p:spPr>
+          <a:xfrm>
+            <a:off x="2104845" y="1584376"/>
+            <a:ext cx="2663179" cy="224287"/>
+          </a:xfrm>
+          <a:prstGeom prst="rect">
+            <a:avLst/>
+          </a:prstGeom>
+        </p:spPr>
+        <p:style>
+          <a:lnRef idx="2">
+            <a:schemeClr val="accent6"/>
+          </a:lnRef>
+          <a:fillRef idx="1">
+            <a:schemeClr val="lt1"/>
+          </a:fillRef>
+          <a:effectRef idx="0">
+            <a:schemeClr val="accent6"/>
+          </a:effectRef>
+          <a:fontRef idx="minor">
+            <a:schemeClr val="dk1"/>
+          </a:fontRef>
+        </p:style>
+        <p:txBody>
+          <a:bodyPr rtlCol="0" anchor="ctr"/>
+          <a:lstStyle/>
+          <a:p>
+            <a:r>
+              <a:rPr lang="en-US" sz="1200" dirty="0" smtClean="0">
+                <a:latin typeface="Arial" pitchFamily="34" charset="0"/>
+                <a:cs typeface="Arial" pitchFamily="34" charset="0"/>
+              </a:rPr>
+              <a:t>Class</a:t>
+            </a:r>
+            <a:endParaRPr lang="en-IN" sz="1200" dirty="0">
+              <a:latin typeface="Arial" pitchFamily="34" charset="0"/>
+              <a:cs typeface="Arial" pitchFamily="34" charset="0"/>
+            </a:endParaRPr>
+          </a:p>
+        </p:txBody>
+      </p:sp>
+      <p:sp>
+        <p:nvSpPr>
+          <p:cNvPr id="68" name="Down Arrow 67"/>
+          <p:cNvSpPr/>
+          <p:nvPr/>
+        </p:nvSpPr>
+        <p:spPr>
+          <a:xfrm>
+            <a:off x="4607787" y="1603839"/>
+            <a:ext cx="127869" cy="185361"/>
+          </a:xfrm>
+          <a:prstGeom prst="downArrow">
+            <a:avLst/>
+          </a:prstGeom>
+        </p:spPr>
+        <p:style>
+          <a:lnRef idx="2">
+            <a:schemeClr val="accent1">
+              <a:shade val="50000"/>
+            </a:schemeClr>
+          </a:lnRef>
+          <a:fillRef idx="1">
+            <a:schemeClr val="accent1"/>
+          </a:fillRef>
+          <a:effectRef idx="0">
+            <a:schemeClr val="accent1"/>
+          </a:effectRef>
+          <a:fontRef idx="minor">
+            <a:schemeClr val="lt1"/>
+          </a:fontRef>
+        </p:style>
+        <p:txBody>
+          <a:bodyPr rtlCol="0" anchor="ctr"/>
+          <a:lstStyle/>
+          <a:p>
+            <a:pPr algn="ctr"/>
+            <a:endParaRPr lang="en-IN"/>
+          </a:p>
+        </p:txBody>
+      </p:sp>
+      <p:sp>
+        <p:nvSpPr>
+          <p:cNvPr id="72" name="Rectangle 71"/>
+          <p:cNvSpPr/>
+          <p:nvPr/>
+        </p:nvSpPr>
+        <p:spPr>
+          <a:xfrm>
+            <a:off x="2104845" y="1926548"/>
+            <a:ext cx="2663179" cy="224287"/>
+          </a:xfrm>
+          <a:prstGeom prst="rect">
+            <a:avLst/>
+          </a:prstGeom>
+        </p:spPr>
+        <p:style>
+          <a:lnRef idx="2">
+            <a:schemeClr val="accent6"/>
+          </a:lnRef>
+          <a:fillRef idx="1">
+            <a:schemeClr val="lt1"/>
+          </a:fillRef>
+          <a:effectRef idx="0">
+            <a:schemeClr val="accent6"/>
+          </a:effectRef>
+          <a:fontRef idx="minor">
+            <a:schemeClr val="dk1"/>
+          </a:fontRef>
+        </p:style>
+        <p:txBody>
+          <a:bodyPr rtlCol="0" anchor="ctr"/>
+          <a:lstStyle/>
+          <a:p>
+            <a:r>
+              <a:rPr lang="en-US" sz="1200" dirty="0" smtClean="0">
+                <a:latin typeface="Arial" pitchFamily="34" charset="0"/>
+                <a:cs typeface="Arial" pitchFamily="34" charset="0"/>
+              </a:rPr>
+              <a:t>Board</a:t>
+            </a:r>
+            <a:endParaRPr lang="en-IN" sz="1200" dirty="0">
+              <a:latin typeface="Arial" pitchFamily="34" charset="0"/>
+              <a:cs typeface="Arial" pitchFamily="34" charset="0"/>
+            </a:endParaRPr>
+          </a:p>
+        </p:txBody>
+      </p:sp>
+      <p:sp>
+        <p:nvSpPr>
+          <p:cNvPr id="73" name="Down Arrow 72"/>
+          <p:cNvSpPr/>
+          <p:nvPr/>
+        </p:nvSpPr>
+        <p:spPr>
+          <a:xfrm>
+            <a:off x="4600051" y="1936743"/>
+            <a:ext cx="127869" cy="203897"/>
+          </a:xfrm>
+          <a:prstGeom prst="downArrow">
+            <a:avLst/>
+          </a:prstGeom>
+        </p:spPr>
+        <p:style>
+          <a:lnRef idx="2">
+            <a:schemeClr val="accent1">
+              <a:shade val="50000"/>
+            </a:schemeClr>
+          </a:lnRef>
+          <a:fillRef idx="1">
+            <a:schemeClr val="accent1"/>
+          </a:fillRef>
+          <a:effectRef idx="0">
+            <a:schemeClr val="accent1"/>
+          </a:effectRef>
+          <a:fontRef idx="minor">
+            <a:schemeClr val="lt1"/>
+          </a:fontRef>
+        </p:style>
+        <p:txBody>
+          <a:bodyPr rtlCol="0" anchor="ctr"/>
+          <a:lstStyle/>
+          <a:p>
+            <a:pPr algn="ctr"/>
+            <a:endParaRPr lang="en-IN"/>
+          </a:p>
+        </p:txBody>
+      </p:sp>
+      <p:sp>
+        <p:nvSpPr>
+          <p:cNvPr id="74" name="Rectangle 73"/>
+          <p:cNvSpPr/>
+          <p:nvPr/>
+        </p:nvSpPr>
+        <p:spPr>
+          <a:xfrm>
+            <a:off x="2101977" y="2260094"/>
+            <a:ext cx="2663179" cy="224287"/>
+          </a:xfrm>
+          <a:prstGeom prst="rect">
+            <a:avLst/>
+          </a:prstGeom>
+        </p:spPr>
+        <p:style>
+          <a:lnRef idx="2">
+            <a:schemeClr val="accent6"/>
+          </a:lnRef>
+          <a:fillRef idx="1">
+            <a:schemeClr val="lt1"/>
+          </a:fillRef>
+          <a:effectRef idx="0">
+            <a:schemeClr val="accent6"/>
+          </a:effectRef>
+          <a:fontRef idx="minor">
+            <a:schemeClr val="dk1"/>
+          </a:fontRef>
+        </p:style>
+        <p:txBody>
+          <a:bodyPr rtlCol="0" anchor="ctr"/>
+          <a:lstStyle/>
+          <a:p>
+            <a:r>
+              <a:rPr lang="en-US" sz="1200" dirty="0" smtClean="0">
+                <a:latin typeface="Arial" pitchFamily="34" charset="0"/>
+                <a:cs typeface="Arial" pitchFamily="34" charset="0"/>
+              </a:rPr>
+              <a:t>Teacher </a:t>
+            </a:r>
+            <a:r>
+              <a:rPr lang="en-US" sz="1200" dirty="0" err="1" smtClean="0">
+                <a:latin typeface="Arial" pitchFamily="34" charset="0"/>
+                <a:cs typeface="Arial" pitchFamily="34" charset="0"/>
+              </a:rPr>
+              <a:t>name,Language</a:t>
+            </a:r>
+            <a:endParaRPr lang="en-IN" sz="1200" dirty="0">
+              <a:latin typeface="Arial" pitchFamily="34" charset="0"/>
+              <a:cs typeface="Arial" pitchFamily="34" charset="0"/>
+            </a:endParaRPr>
           </a:p>
         </p:txBody>
       </p:sp>
@@ -25141,7 +25393,7 @@
   <a:extraClrSchemeLst/>
   <a:extLst>
     <a:ext uri="{05A4C25C-085E-4340-85A3-A5531E510DB2}">
-      <thm15:themeFamily xmlns="" xmlns:thm15="http://schemas.microsoft.com/office/thememl/2012/main" name="Office Theme" id="{62F939B6-93AF-4DB8-9C6B-D6C7DFDC589F}" vid="{4A3C46E8-61CC-4603-A589-7422A47A8E4A}"/>
+      <thm15:themeFamily xmlns:thm15="http://schemas.microsoft.com/office/thememl/2012/main" xmlns="" name="Office Theme" id="{62F939B6-93AF-4DB8-9C6B-D6C7DFDC589F}" vid="{4A3C46E8-61CC-4603-A589-7422A47A8E4A}"/>
     </a:ext>
   </a:extLst>
 </a:theme>

</xml_diff>